<commit_message>
First cut of data logging web pages
</commit_message>
<xml_diff>
--- a/Logo.pptx
+++ b/Logo.pptx
@@ -263,7 +263,7 @@
           <a:p>
             <a:fld id="{4967892D-CE2D-495A-A9CA-7CB88C831AAA}" type="datetimeFigureOut">
               <a:rPr lang="en-IN" smtClean="0"/>
-              <a:t>20-07-2021</a:t>
+              <a:t>26-07-2021</a:t>
             </a:fld>
             <a:endParaRPr lang="en-IN"/>
           </a:p>
@@ -463,7 +463,7 @@
           <a:p>
             <a:fld id="{4967892D-CE2D-495A-A9CA-7CB88C831AAA}" type="datetimeFigureOut">
               <a:rPr lang="en-IN" smtClean="0"/>
-              <a:t>20-07-2021</a:t>
+              <a:t>26-07-2021</a:t>
             </a:fld>
             <a:endParaRPr lang="en-IN"/>
           </a:p>
@@ -673,7 +673,7 @@
           <a:p>
             <a:fld id="{4967892D-CE2D-495A-A9CA-7CB88C831AAA}" type="datetimeFigureOut">
               <a:rPr lang="en-IN" smtClean="0"/>
-              <a:t>20-07-2021</a:t>
+              <a:t>26-07-2021</a:t>
             </a:fld>
             <a:endParaRPr lang="en-IN"/>
           </a:p>
@@ -873,7 +873,7 @@
           <a:p>
             <a:fld id="{4967892D-CE2D-495A-A9CA-7CB88C831AAA}" type="datetimeFigureOut">
               <a:rPr lang="en-IN" smtClean="0"/>
-              <a:t>20-07-2021</a:t>
+              <a:t>26-07-2021</a:t>
             </a:fld>
             <a:endParaRPr lang="en-IN"/>
           </a:p>
@@ -1149,7 +1149,7 @@
           <a:p>
             <a:fld id="{4967892D-CE2D-495A-A9CA-7CB88C831AAA}" type="datetimeFigureOut">
               <a:rPr lang="en-IN" smtClean="0"/>
-              <a:t>20-07-2021</a:t>
+              <a:t>26-07-2021</a:t>
             </a:fld>
             <a:endParaRPr lang="en-IN"/>
           </a:p>
@@ -1417,7 +1417,7 @@
           <a:p>
             <a:fld id="{4967892D-CE2D-495A-A9CA-7CB88C831AAA}" type="datetimeFigureOut">
               <a:rPr lang="en-IN" smtClean="0"/>
-              <a:t>20-07-2021</a:t>
+              <a:t>26-07-2021</a:t>
             </a:fld>
             <a:endParaRPr lang="en-IN"/>
           </a:p>
@@ -1832,7 +1832,7 @@
           <a:p>
             <a:fld id="{4967892D-CE2D-495A-A9CA-7CB88C831AAA}" type="datetimeFigureOut">
               <a:rPr lang="en-IN" smtClean="0"/>
-              <a:t>20-07-2021</a:t>
+              <a:t>26-07-2021</a:t>
             </a:fld>
             <a:endParaRPr lang="en-IN"/>
           </a:p>
@@ -1974,7 +1974,7 @@
           <a:p>
             <a:fld id="{4967892D-CE2D-495A-A9CA-7CB88C831AAA}" type="datetimeFigureOut">
               <a:rPr lang="en-IN" smtClean="0"/>
-              <a:t>20-07-2021</a:t>
+              <a:t>26-07-2021</a:t>
             </a:fld>
             <a:endParaRPr lang="en-IN"/>
           </a:p>
@@ -2087,7 +2087,7 @@
           <a:p>
             <a:fld id="{4967892D-CE2D-495A-A9CA-7CB88C831AAA}" type="datetimeFigureOut">
               <a:rPr lang="en-IN" smtClean="0"/>
-              <a:t>20-07-2021</a:t>
+              <a:t>26-07-2021</a:t>
             </a:fld>
             <a:endParaRPr lang="en-IN"/>
           </a:p>
@@ -2400,7 +2400,7 @@
           <a:p>
             <a:fld id="{4967892D-CE2D-495A-A9CA-7CB88C831AAA}" type="datetimeFigureOut">
               <a:rPr lang="en-IN" smtClean="0"/>
-              <a:t>20-07-2021</a:t>
+              <a:t>26-07-2021</a:t>
             </a:fld>
             <a:endParaRPr lang="en-IN"/>
           </a:p>
@@ -2689,7 +2689,7 @@
           <a:p>
             <a:fld id="{4967892D-CE2D-495A-A9CA-7CB88C831AAA}" type="datetimeFigureOut">
               <a:rPr lang="en-IN" smtClean="0"/>
-              <a:t>20-07-2021</a:t>
+              <a:t>26-07-2021</a:t>
             </a:fld>
             <a:endParaRPr lang="en-IN"/>
           </a:p>
@@ -2932,7 +2932,7 @@
           <a:p>
             <a:fld id="{4967892D-CE2D-495A-A9CA-7CB88C831AAA}" type="datetimeFigureOut">
               <a:rPr lang="en-IN" smtClean="0"/>
-              <a:t>20-07-2021</a:t>
+              <a:t>26-07-2021</a:t>
             </a:fld>
             <a:endParaRPr lang="en-IN"/>
           </a:p>
@@ -3363,7 +3363,7 @@
         </p:nvGrpSpPr>
         <p:grpSpPr>
           <a:xfrm>
-            <a:off x="2143432" y="1620665"/>
+            <a:off x="2507221" y="734511"/>
             <a:ext cx="8731046" cy="1615731"/>
             <a:chOff x="2143432" y="1620665"/>
             <a:chExt cx="8731046" cy="1615731"/>
@@ -3572,7 +3572,7 @@
                   </a:solidFill>
                   <a:latin typeface="Cera Pro Medium" panose="00000600000000000000" pitchFamily="50" charset="0"/>
                 </a:rPr>
-                <a:t>RESPIMATIC 100 WEB DASHBOARD</a:t>
+                <a:t>RESPIMATIC 100 WEB LOGGER</a:t>
               </a:r>
               <a:endParaRPr lang="en-IN" sz="3200" b="1" dirty="0">
                 <a:solidFill>
@@ -3598,7 +3598,7 @@
         </p:nvGrpSpPr>
         <p:grpSpPr>
           <a:xfrm>
-            <a:off x="2143431" y="4830314"/>
+            <a:off x="2556385" y="5471925"/>
             <a:ext cx="8731045" cy="1013005"/>
             <a:chOff x="2143431" y="4830314"/>
             <a:chExt cx="8731045" cy="1013005"/>
@@ -3788,7 +3788,7 @@
         </p:nvSpPr>
         <p:spPr>
           <a:xfrm>
-            <a:off x="6558116" y="3608156"/>
+            <a:off x="6971070" y="4320898"/>
             <a:ext cx="4316360" cy="954107"/>
           </a:xfrm>
           <a:prstGeom prst="rect">
@@ -3852,36 +3852,6 @@
       </p:sp>
       <p:pic>
         <p:nvPicPr>
-          <p:cNvPr id="10" name="Picture 9">
-            <a:extLst>
-              <a:ext uri="{FF2B5EF4-FFF2-40B4-BE49-F238E27FC236}">
-                <a16:creationId xmlns:a16="http://schemas.microsoft.com/office/drawing/2014/main" id="{5D9D0149-C966-42E3-9ECE-005AB8E6BC1A}"/>
-              </a:ext>
-            </a:extLst>
-          </p:cNvPr>
-          <p:cNvPicPr>
-            <a:picLocks noChangeAspect="1"/>
-          </p:cNvPicPr>
-          <p:nvPr/>
-        </p:nvPicPr>
-        <p:blipFill>
-          <a:blip r:embed="rId5"/>
-          <a:stretch>
-            <a:fillRect/>
-          </a:stretch>
-        </p:blipFill>
-        <p:spPr>
-          <a:xfrm>
-            <a:off x="1317524" y="3571966"/>
-            <a:ext cx="2305050" cy="952500"/>
-          </a:xfrm>
-          <a:prstGeom prst="rect">
-            <a:avLst/>
-          </a:prstGeom>
-        </p:spPr>
-      </p:pic>
-      <p:pic>
-        <p:nvPicPr>
           <p:cNvPr id="8" name="Picture 7">
             <a:extLst>
               <a:ext uri="{FF2B5EF4-FFF2-40B4-BE49-F238E27FC236}">
@@ -3895,13 +3865,13 @@
           <p:nvPr/>
         </p:nvPicPr>
         <p:blipFill rotWithShape="1">
-          <a:blip r:embed="rId6"/>
+          <a:blip r:embed="rId5"/>
           <a:srcRect t="15238" r="14265"/>
           <a:stretch/>
         </p:blipFill>
         <p:spPr>
           <a:xfrm>
-            <a:off x="161931" y="217118"/>
+            <a:off x="119641" y="5336816"/>
             <a:ext cx="1981500" cy="1403547"/>
           </a:xfrm>
           <a:prstGeom prst="rect">
@@ -3909,6 +3879,317 @@
           </a:prstGeom>
         </p:spPr>
       </p:pic>
+      <p:sp>
+        <p:nvSpPr>
+          <p:cNvPr id="16" name="TextBox 15">
+            <a:extLst>
+              <a:ext uri="{FF2B5EF4-FFF2-40B4-BE49-F238E27FC236}">
+                <a16:creationId xmlns:a16="http://schemas.microsoft.com/office/drawing/2014/main" id="{C2E6DEFE-C727-489E-A1A5-AF5A911738E9}"/>
+              </a:ext>
+            </a:extLst>
+          </p:cNvPr>
+          <p:cNvSpPr txBox="1"/>
+          <p:nvPr/>
+        </p:nvSpPr>
+        <p:spPr>
+          <a:xfrm>
+            <a:off x="2556385" y="4325891"/>
+            <a:ext cx="4316360" cy="954107"/>
+          </a:xfrm>
+          <a:prstGeom prst="rect">
+            <a:avLst/>
+          </a:prstGeom>
+          <a:solidFill>
+            <a:srgbClr val="1D85AD"/>
+          </a:solidFill>
+          <a:ln w="12700">
+            <a:solidFill>
+              <a:schemeClr val="bg1"/>
+            </a:solidFill>
+          </a:ln>
+        </p:spPr>
+        <p:txBody>
+          <a:bodyPr wrap="square" rtlCol="0">
+            <a:spAutoFit/>
+          </a:bodyPr>
+          <a:lstStyle/>
+          <a:p>
+            <a:pPr algn="ctr"/>
+            <a:r>
+              <a:rPr lang="en-US" sz="2800" b="1" dirty="0">
+                <a:solidFill>
+                  <a:schemeClr val="bg1"/>
+                </a:solidFill>
+                <a:latin typeface="Arial" panose="020B0604020202020204" pitchFamily="34" charset="0"/>
+                <a:cs typeface="Arial" panose="020B0604020202020204" pitchFamily="34" charset="0"/>
+              </a:rPr>
+              <a:t>WEB LOGGER </a:t>
+            </a:r>
+            <a:endParaRPr lang="en-US" sz="2800" b="1" i="1" dirty="0">
+              <a:solidFill>
+                <a:schemeClr val="bg1"/>
+              </a:solidFill>
+              <a:latin typeface="Arial" panose="020B0604020202020204" pitchFamily="34" charset="0"/>
+              <a:cs typeface="Arial" panose="020B0604020202020204" pitchFamily="34" charset="0"/>
+            </a:endParaRPr>
+          </a:p>
+          <a:p>
+            <a:pPr algn="ctr"/>
+            <a:r>
+              <a:rPr lang="en-US" sz="2800" b="1" dirty="0">
+                <a:solidFill>
+                  <a:schemeClr val="bg1"/>
+                </a:solidFill>
+                <a:latin typeface="Arial" panose="020B0604020202020204" pitchFamily="34" charset="0"/>
+                <a:cs typeface="Arial" panose="020B0604020202020204" pitchFamily="34" charset="0"/>
+              </a:rPr>
+              <a:t>RESPIMATIC 100 </a:t>
+            </a:r>
+            <a:endParaRPr lang="en-IN" sz="2800" b="1" dirty="0">
+              <a:solidFill>
+                <a:schemeClr val="bg1"/>
+              </a:solidFill>
+              <a:latin typeface="Arial" panose="020B0604020202020204" pitchFamily="34" charset="0"/>
+              <a:cs typeface="Arial" panose="020B0604020202020204" pitchFamily="34" charset="0"/>
+            </a:endParaRPr>
+          </a:p>
+        </p:txBody>
+      </p:sp>
+      <p:grpSp>
+        <p:nvGrpSpPr>
+          <p:cNvPr id="18" name="Group 17">
+            <a:extLst>
+              <a:ext uri="{FF2B5EF4-FFF2-40B4-BE49-F238E27FC236}">
+                <a16:creationId xmlns:a16="http://schemas.microsoft.com/office/drawing/2014/main" id="{C8BE37C5-9332-4D4C-AD00-74BB5800C3E0}"/>
+              </a:ext>
+            </a:extLst>
+          </p:cNvPr>
+          <p:cNvGrpSpPr/>
+          <p:nvPr/>
+        </p:nvGrpSpPr>
+        <p:grpSpPr>
+          <a:xfrm>
+            <a:off x="2556384" y="2533579"/>
+            <a:ext cx="8731046" cy="1615731"/>
+            <a:chOff x="2143432" y="1620665"/>
+            <a:chExt cx="8731046" cy="1615731"/>
+          </a:xfrm>
+        </p:grpSpPr>
+        <p:sp>
+          <p:nvSpPr>
+            <p:cNvPr id="19" name="Rectangle 18">
+              <a:extLst>
+                <a:ext uri="{FF2B5EF4-FFF2-40B4-BE49-F238E27FC236}">
+                  <a16:creationId xmlns:a16="http://schemas.microsoft.com/office/drawing/2014/main" id="{6ACFA861-5FF8-42DC-8719-2189881D8E02}"/>
+                </a:ext>
+              </a:extLst>
+            </p:cNvPr>
+            <p:cNvSpPr/>
+            <p:nvPr/>
+          </p:nvSpPr>
+          <p:spPr>
+            <a:xfrm>
+              <a:off x="2143433" y="2223391"/>
+              <a:ext cx="8731045" cy="1013005"/>
+            </a:xfrm>
+            <a:prstGeom prst="rect">
+              <a:avLst/>
+            </a:prstGeom>
+            <a:solidFill>
+              <a:srgbClr val="0D3E51"/>
+            </a:solidFill>
+            <a:ln w="28575">
+              <a:noFill/>
+            </a:ln>
+          </p:spPr>
+          <p:style>
+            <a:lnRef idx="2">
+              <a:schemeClr val="accent1">
+                <a:shade val="50000"/>
+              </a:schemeClr>
+            </a:lnRef>
+            <a:fillRef idx="1">
+              <a:schemeClr val="accent1"/>
+            </a:fillRef>
+            <a:effectRef idx="0">
+              <a:schemeClr val="accent1"/>
+            </a:effectRef>
+            <a:fontRef idx="minor">
+              <a:schemeClr val="lt1"/>
+            </a:fontRef>
+          </p:style>
+          <p:txBody>
+            <a:bodyPr rtlCol="0" anchor="ctr"/>
+            <a:lstStyle/>
+            <a:p>
+              <a:pPr algn="ctr"/>
+              <a:endParaRPr lang="en-IN"/>
+            </a:p>
+          </p:txBody>
+        </p:sp>
+        <p:pic>
+          <p:nvPicPr>
+            <p:cNvPr id="20" name="Picture 19">
+              <a:extLst>
+                <a:ext uri="{FF2B5EF4-FFF2-40B4-BE49-F238E27FC236}">
+                  <a16:creationId xmlns:a16="http://schemas.microsoft.com/office/drawing/2014/main" id="{C987E7F5-338D-4871-AC12-5D566D7F9555}"/>
+                </a:ext>
+              </a:extLst>
+            </p:cNvPr>
+            <p:cNvPicPr/>
+            <p:nvPr/>
+          </p:nvPicPr>
+          <p:blipFill>
+            <a:blip r:embed="rId2" cstate="print">
+              <a:extLst>
+                <a:ext uri="{28A0092B-C50C-407E-A947-70E740481C1C}">
+                  <a14:useLocalDpi xmlns:a14="http://schemas.microsoft.com/office/drawing/2010/main" val="0"/>
+                </a:ext>
+              </a:extLst>
+            </a:blip>
+            <a:stretch>
+              <a:fillRect/>
+            </a:stretch>
+          </p:blipFill>
+          <p:spPr>
+            <a:xfrm>
+              <a:off x="2338625" y="2421107"/>
+              <a:ext cx="2920183" cy="656278"/>
+            </a:xfrm>
+            <a:prstGeom prst="rect">
+              <a:avLst/>
+            </a:prstGeom>
+            <a:ln>
+              <a:solidFill>
+                <a:schemeClr val="bg1"/>
+              </a:solidFill>
+            </a:ln>
+          </p:spPr>
+        </p:pic>
+        <p:pic>
+          <p:nvPicPr>
+            <p:cNvPr id="21" name="Picture 20">
+              <a:extLst>
+                <a:ext uri="{FF2B5EF4-FFF2-40B4-BE49-F238E27FC236}">
+                  <a16:creationId xmlns:a16="http://schemas.microsoft.com/office/drawing/2014/main" id="{3A5F41CA-5174-4C09-8165-A1DD0FA447DF}"/>
+                </a:ext>
+              </a:extLst>
+            </p:cNvPr>
+            <p:cNvPicPr/>
+            <p:nvPr/>
+          </p:nvPicPr>
+          <p:blipFill>
+            <a:blip r:embed="rId3" cstate="print">
+              <a:extLst>
+                <a:ext uri="{28A0092B-C50C-407E-A947-70E740481C1C}">
+                  <a14:useLocalDpi xmlns:a14="http://schemas.microsoft.com/office/drawing/2010/main" val="0"/>
+                </a:ext>
+              </a:extLst>
+            </a:blip>
+            <a:stretch/>
+          </p:blipFill>
+          <p:spPr>
+            <a:xfrm>
+              <a:off x="5733773" y="2302896"/>
+              <a:ext cx="1801537" cy="853994"/>
+            </a:xfrm>
+            <a:prstGeom prst="rect">
+              <a:avLst/>
+            </a:prstGeom>
+          </p:spPr>
+        </p:pic>
+        <p:pic>
+          <p:nvPicPr>
+            <p:cNvPr id="22" name="Picture 21">
+              <a:extLst>
+                <a:ext uri="{FF2B5EF4-FFF2-40B4-BE49-F238E27FC236}">
+                  <a16:creationId xmlns:a16="http://schemas.microsoft.com/office/drawing/2014/main" id="{295A3E85-CD50-4315-B303-BA2B8BB3D90D}"/>
+                </a:ext>
+              </a:extLst>
+            </p:cNvPr>
+            <p:cNvPicPr/>
+            <p:nvPr/>
+          </p:nvPicPr>
+          <p:blipFill>
+            <a:blip r:embed="rId4">
+              <a:extLst>
+                <a:ext uri="{28A0092B-C50C-407E-A947-70E740481C1C}">
+                  <a14:useLocalDpi xmlns:a14="http://schemas.microsoft.com/office/drawing/2010/main" val="0"/>
+                </a:ext>
+              </a:extLst>
+            </a:blip>
+            <a:stretch>
+              <a:fillRect/>
+            </a:stretch>
+          </p:blipFill>
+          <p:spPr>
+            <a:xfrm>
+              <a:off x="8010275" y="2421107"/>
+              <a:ext cx="2658625" cy="656278"/>
+            </a:xfrm>
+            <a:prstGeom prst="rect">
+              <a:avLst/>
+            </a:prstGeom>
+            <a:ln>
+              <a:solidFill>
+                <a:schemeClr val="bg1"/>
+              </a:solidFill>
+            </a:ln>
+          </p:spPr>
+        </p:pic>
+        <p:sp>
+          <p:nvSpPr>
+            <p:cNvPr id="23" name="TextBox 22">
+              <a:extLst>
+                <a:ext uri="{FF2B5EF4-FFF2-40B4-BE49-F238E27FC236}">
+                  <a16:creationId xmlns:a16="http://schemas.microsoft.com/office/drawing/2014/main" id="{075BC6D3-903A-4720-A496-0DBA36AA8524}"/>
+                </a:ext>
+              </a:extLst>
+            </p:cNvPr>
+            <p:cNvSpPr txBox="1"/>
+            <p:nvPr/>
+          </p:nvSpPr>
+          <p:spPr>
+            <a:xfrm>
+              <a:off x="2143432" y="1620665"/>
+              <a:ext cx="8731045" cy="584775"/>
+            </a:xfrm>
+            <a:prstGeom prst="rect">
+              <a:avLst/>
+            </a:prstGeom>
+            <a:solidFill>
+              <a:srgbClr val="1D85AD"/>
+            </a:solidFill>
+            <a:ln w="28575">
+              <a:noFill/>
+            </a:ln>
+          </p:spPr>
+          <p:txBody>
+            <a:bodyPr wrap="square" rtlCol="0">
+              <a:spAutoFit/>
+            </a:bodyPr>
+            <a:lstStyle/>
+            <a:p>
+              <a:pPr algn="ctr"/>
+              <a:r>
+                <a:rPr lang="en-US" sz="3200" b="1" dirty="0">
+                  <a:solidFill>
+                    <a:schemeClr val="bg1"/>
+                  </a:solidFill>
+                  <a:latin typeface="Cera Pro Medium" panose="00000600000000000000" pitchFamily="50" charset="0"/>
+                </a:rPr>
+                <a:t>RESPIMATIC 100 WEB DASHBOARD</a:t>
+              </a:r>
+              <a:endParaRPr lang="en-IN" sz="3200" b="1" dirty="0">
+                <a:solidFill>
+                  <a:schemeClr val="bg1"/>
+                </a:solidFill>
+                <a:latin typeface="Cera Pro Medium" panose="00000600000000000000" pitchFamily="50" charset="0"/>
+              </a:endParaRPr>
+            </a:p>
+          </p:txBody>
+        </p:sp>
+      </p:grpSp>
     </p:spTree>
     <p:extLst>
       <p:ext uri="{BB962C8B-B14F-4D97-AF65-F5344CB8AC3E}">

</xml_diff>